<commit_message>
update input parameters and documentation
</commit_message>
<xml_diff>
--- a/Example_Systems/PiecewiseFuel_CO2_Example/PiecewiseFuelUsage_data_description.pptx
+++ b/Example_Systems/PiecewiseFuel_CO2_Example/PiecewiseFuelUsage_data_description.pptx
@@ -259,7 +259,7 @@
           <a:p>
             <a:fld id="{D5D24148-8AB8-449F-8CCC-1D018283E047}" type="datetimeFigureOut">
               <a:rPr lang="en-US" smtClean="0"/>
-              <a:t>9/12/2023</a:t>
+              <a:t>9/14/2023</a:t>
             </a:fld>
             <a:endParaRPr lang="en-US"/>
           </a:p>
@@ -457,7 +457,7 @@
           <a:p>
             <a:fld id="{D5D24148-8AB8-449F-8CCC-1D018283E047}" type="datetimeFigureOut">
               <a:rPr lang="en-US" smtClean="0"/>
-              <a:t>9/12/2023</a:t>
+              <a:t>9/14/2023</a:t>
             </a:fld>
             <a:endParaRPr lang="en-US"/>
           </a:p>
@@ -665,7 +665,7 @@
           <a:p>
             <a:fld id="{D5D24148-8AB8-449F-8CCC-1D018283E047}" type="datetimeFigureOut">
               <a:rPr lang="en-US" smtClean="0"/>
-              <a:t>9/12/2023</a:t>
+              <a:t>9/14/2023</a:t>
             </a:fld>
             <a:endParaRPr lang="en-US"/>
           </a:p>
@@ -863,7 +863,7 @@
           <a:p>
             <a:fld id="{D5D24148-8AB8-449F-8CCC-1D018283E047}" type="datetimeFigureOut">
               <a:rPr lang="en-US" smtClean="0"/>
-              <a:t>9/12/2023</a:t>
+              <a:t>9/14/2023</a:t>
             </a:fld>
             <a:endParaRPr lang="en-US"/>
           </a:p>
@@ -1138,7 +1138,7 @@
           <a:p>
             <a:fld id="{D5D24148-8AB8-449F-8CCC-1D018283E047}" type="datetimeFigureOut">
               <a:rPr lang="en-US" smtClean="0"/>
-              <a:t>9/12/2023</a:t>
+              <a:t>9/14/2023</a:t>
             </a:fld>
             <a:endParaRPr lang="en-US"/>
           </a:p>
@@ -1403,7 +1403,7 @@
           <a:p>
             <a:fld id="{D5D24148-8AB8-449F-8CCC-1D018283E047}" type="datetimeFigureOut">
               <a:rPr lang="en-US" smtClean="0"/>
-              <a:t>9/12/2023</a:t>
+              <a:t>9/14/2023</a:t>
             </a:fld>
             <a:endParaRPr lang="en-US"/>
           </a:p>
@@ -1815,7 +1815,7 @@
           <a:p>
             <a:fld id="{D5D24148-8AB8-449F-8CCC-1D018283E047}" type="datetimeFigureOut">
               <a:rPr lang="en-US" smtClean="0"/>
-              <a:t>9/12/2023</a:t>
+              <a:t>9/14/2023</a:t>
             </a:fld>
             <a:endParaRPr lang="en-US"/>
           </a:p>
@@ -1956,7 +1956,7 @@
           <a:p>
             <a:fld id="{D5D24148-8AB8-449F-8CCC-1D018283E047}" type="datetimeFigureOut">
               <a:rPr lang="en-US" smtClean="0"/>
-              <a:t>9/12/2023</a:t>
+              <a:t>9/14/2023</a:t>
             </a:fld>
             <a:endParaRPr lang="en-US"/>
           </a:p>
@@ -2069,7 +2069,7 @@
           <a:p>
             <a:fld id="{D5D24148-8AB8-449F-8CCC-1D018283E047}" type="datetimeFigureOut">
               <a:rPr lang="en-US" smtClean="0"/>
-              <a:t>9/12/2023</a:t>
+              <a:t>9/14/2023</a:t>
             </a:fld>
             <a:endParaRPr lang="en-US"/>
           </a:p>
@@ -2380,7 +2380,7 @@
           <a:p>
             <a:fld id="{D5D24148-8AB8-449F-8CCC-1D018283E047}" type="datetimeFigureOut">
               <a:rPr lang="en-US" smtClean="0"/>
-              <a:t>9/12/2023</a:t>
+              <a:t>9/14/2023</a:t>
             </a:fld>
             <a:endParaRPr lang="en-US"/>
           </a:p>
@@ -2668,7 +2668,7 @@
           <a:p>
             <a:fld id="{D5D24148-8AB8-449F-8CCC-1D018283E047}" type="datetimeFigureOut">
               <a:rPr lang="en-US" smtClean="0"/>
-              <a:t>9/12/2023</a:t>
+              <a:t>9/14/2023</a:t>
             </a:fld>
             <a:endParaRPr lang="en-US"/>
           </a:p>
@@ -2909,7 +2909,7 @@
           <a:p>
             <a:fld id="{D5D24148-8AB8-449F-8CCC-1D018283E047}" type="datetimeFigureOut">
               <a:rPr lang="en-US" smtClean="0"/>
-              <a:t>9/12/2023</a:t>
+              <a:t>9/14/2023</a:t>
             </a:fld>
             <a:endParaRPr lang="en-US"/>
           </a:p>
@@ -3558,7 +3558,7 @@
         <p:spPr>
           <a:xfrm>
             <a:off x="4142333" y="6327654"/>
-            <a:ext cx="1867050" cy="369332"/>
+            <a:ext cx="1252266" cy="369332"/>
           </a:xfrm>
           <a:prstGeom prst="rect">
             <a:avLst/>
@@ -3573,7 +3573,7 @@
           <a:p>
             <a:r>
               <a:rPr lang="en-US" b="1" dirty="0"/>
-              <a:t>Generation (MW)</a:t>
+              <a:t>Load (MW)</a:t>
             </a:r>
           </a:p>
         </p:txBody>
@@ -3635,11 +3635,11 @@
           <a:prstGeom prst="line">
             <a:avLst/>
           </a:prstGeom>
-          <a:ln w="38100">
+          <a:ln w="9525">
             <a:solidFill>
               <a:schemeClr val="tx1"/>
             </a:solidFill>
-            <a:prstDash val="lgDash"/>
+            <a:prstDash val="lgDashDotDot"/>
           </a:ln>
         </p:spPr>
         <p:style>
@@ -3679,11 +3679,11 @@
           <a:prstGeom prst="line">
             <a:avLst/>
           </a:prstGeom>
-          <a:ln w="38100">
+          <a:ln w="9525">
             <a:solidFill>
               <a:schemeClr val="tx1"/>
             </a:solidFill>
-            <a:prstDash val="lgDash"/>
+            <a:prstDash val="lgDashDotDot"/>
           </a:ln>
         </p:spPr>
         <p:style>
@@ -3723,11 +3723,11 @@
           <a:prstGeom prst="line">
             <a:avLst/>
           </a:prstGeom>
-          <a:ln w="38100">
+          <a:ln w="9525">
             <a:solidFill>
               <a:schemeClr val="tx1"/>
             </a:solidFill>
-            <a:prstDash val="lgDash"/>
+            <a:prstDash val="lgDashDotDot"/>
           </a:ln>
         </p:spPr>
         <p:style>
@@ -3760,7 +3760,7 @@
         <p:spPr>
           <a:xfrm>
             <a:off x="2914227" y="6058954"/>
-            <a:ext cx="1313180" cy="215444"/>
+            <a:ext cx="1603324" cy="246221"/>
           </a:xfrm>
           <a:prstGeom prst="rect">
             <a:avLst/>
@@ -3774,7 +3774,7 @@
           <a:lstStyle/>
           <a:p>
             <a:r>
-              <a:rPr lang="en-US" sz="800" b="1" dirty="0"/>
+              <a:rPr lang="en-US" sz="1000" b="1" dirty="0"/>
               <a:t>PWFU_Load_Point_MW_1</a:t>
             </a:r>
           </a:p>
@@ -3794,8 +3794,8 @@
         </p:nvSpPr>
         <p:spPr>
           <a:xfrm>
-            <a:off x="4654434" y="6082031"/>
-            <a:ext cx="1313180" cy="215444"/>
+            <a:off x="4558023" y="6058953"/>
+            <a:ext cx="1603324" cy="246221"/>
           </a:xfrm>
           <a:prstGeom prst="rect">
             <a:avLst/>
@@ -3809,7 +3809,7 @@
           <a:lstStyle/>
           <a:p>
             <a:r>
-              <a:rPr lang="en-US" sz="800" b="1" dirty="0"/>
+              <a:rPr lang="en-US" sz="1000" b="1" dirty="0"/>
               <a:t>PWFU_Load_Point_MW_2</a:t>
             </a:r>
           </a:p>
@@ -3829,8 +3829,8 @@
         </p:nvSpPr>
         <p:spPr>
           <a:xfrm>
-            <a:off x="6096000" y="6063579"/>
-            <a:ext cx="1313180" cy="215444"/>
+            <a:off x="6129964" y="6035419"/>
+            <a:ext cx="1603324" cy="246221"/>
           </a:xfrm>
           <a:prstGeom prst="rect">
             <a:avLst/>
@@ -3844,7 +3844,7 @@
           <a:lstStyle/>
           <a:p>
             <a:r>
-              <a:rPr lang="en-US" sz="800" b="1" dirty="0"/>
+              <a:rPr lang="en-US" sz="1000" b="1" dirty="0"/>
               <a:t>PWFU_Load_Point_MW_3</a:t>
             </a:r>
           </a:p>
@@ -3880,7 +3880,7 @@
           <a:p>
             <a:r>
               <a:rPr lang="en-US" sz="1200" b="1" dirty="0" err="1"/>
-              <a:t>PWFU_Fuel_Usage_MMBTU_per_h</a:t>
+              <a:t>PWFU_Fuel_Usage_Zero_Load_MMBTU_per_h</a:t>
             </a:r>
             <a:endParaRPr lang="en-US" sz="1200" b="1" dirty="0"/>
           </a:p>
@@ -4017,8 +4017,8 @@
         </p:nvSpPr>
         <p:spPr>
           <a:xfrm>
-            <a:off x="1975978" y="4817880"/>
-            <a:ext cx="2939577" cy="215444"/>
+            <a:off x="2279521" y="4730578"/>
+            <a:ext cx="2939577" cy="246221"/>
           </a:xfrm>
           <a:prstGeom prst="rect">
             <a:avLst/>
@@ -4032,7 +4032,7 @@
           <a:lstStyle/>
           <a:p>
             <a:r>
-              <a:rPr lang="en-US" sz="800" b="1" dirty="0"/>
+              <a:rPr lang="en-US" sz="1000" b="1" dirty="0"/>
               <a:t>PWFU_Heat_Rate_MMBTU_per_MWh_1</a:t>
             </a:r>
           </a:p>
@@ -4130,8 +4130,8 @@
         </p:nvSpPr>
         <p:spPr>
           <a:xfrm>
-            <a:off x="3470047" y="3622475"/>
-            <a:ext cx="2939577" cy="215444"/>
+            <a:off x="2482148" y="2828872"/>
+            <a:ext cx="2939577" cy="246221"/>
           </a:xfrm>
           <a:prstGeom prst="rect">
             <a:avLst/>
@@ -4145,7 +4145,7 @@
           <a:lstStyle/>
           <a:p>
             <a:r>
-              <a:rPr lang="en-US" sz="800" b="1" dirty="0"/>
+              <a:rPr lang="en-US" sz="1000" b="1" dirty="0"/>
               <a:t>PWFU_Heat_Rate_MMBTU_per_MWh_2</a:t>
             </a:r>
           </a:p>
@@ -4165,8 +4165,8 @@
         </p:nvSpPr>
         <p:spPr>
           <a:xfrm>
-            <a:off x="4626211" y="1877168"/>
-            <a:ext cx="2939577" cy="215444"/>
+            <a:off x="3760811" y="1147595"/>
+            <a:ext cx="2939577" cy="246221"/>
           </a:xfrm>
           <a:prstGeom prst="rect">
             <a:avLst/>
@@ -4180,7 +4180,7 @@
           <a:lstStyle/>
           <a:p>
             <a:r>
-              <a:rPr lang="en-US" sz="800" b="1" dirty="0"/>
+              <a:rPr lang="en-US" sz="1000" b="1" dirty="0"/>
               <a:t>PWFU_Heat_Rate_MMBTU_per_MWh_3</a:t>
             </a:r>
           </a:p>
@@ -4279,14 +4279,14 @@
           <p:nvPr>
             <p:extLst>
               <p:ext uri="{D42A27DB-BD31-4B8C-83A1-F6EECF244321}">
-                <p14:modId xmlns:p14="http://schemas.microsoft.com/office/powerpoint/2010/main" val="682093677"/>
+                <p14:modId xmlns:p14="http://schemas.microsoft.com/office/powerpoint/2010/main" val="4263456008"/>
               </p:ext>
             </p:extLst>
           </p:nvPr>
         </p:nvGraphicFramePr>
         <p:xfrm>
           <a:off x="7429867" y="619283"/>
-          <a:ext cx="4654960" cy="5042838"/>
+          <a:ext cx="4654960" cy="5055805"/>
         </p:xfrm>
         <a:graphic>
           <a:graphicData uri="http://schemas.openxmlformats.org/drawingml/2006/table">
@@ -4368,7 +4368,7 @@
                       </a:pPr>
                       <a:r>
                         <a:rPr lang="en-US" sz="1200" b="0" dirty="0" err="1"/>
-                        <a:t>PWFU_Fuel_Usage_MMBTU_per_h</a:t>
+                        <a:t>PWFU_Fuel_Usage_Zero_Load_MMBTU_per_h</a:t>
                       </a:r>
                       <a:endParaRPr lang="en-US" sz="1200" b="0" dirty="0"/>
                     </a:p>
@@ -4382,7 +4382,7 @@
                     <a:p>
                       <a:r>
                         <a:rPr lang="en-US" sz="1200" b="0" dirty="0"/>
-                        <a:t>The fuel usage (MMBTU/h) for the first PWFU segment (y-intercept)</a:t>
+                        <a:t>The fuel usage (MMBTU/h) for the first PWFU segment (y-intercept) at zero load</a:t>
                       </a:r>
                     </a:p>
                   </a:txBody>
@@ -4736,7 +4736,7 @@
         <p:spPr>
           <a:xfrm>
             <a:off x="19971" y="67008"/>
-            <a:ext cx="2642390" cy="276999"/>
+            <a:ext cx="3009157" cy="461665"/>
           </a:xfrm>
           <a:prstGeom prst="rect">
             <a:avLst/>
@@ -4761,6 +4761,20 @@
               <a:rPr lang="en-US" sz="1200" dirty="0"/>
               <a:t> et al (2020)</a:t>
             </a:r>
+          </a:p>
+          <a:p>
+            <a:r>
+              <a:rPr lang="en-US" sz="1200" b="0" i="0" u="none" strike="noStrike" dirty="0">
+                <a:solidFill>
+                  <a:srgbClr val="000000"/>
+                </a:solidFill>
+                <a:effectLst/>
+                <a:latin typeface="Roboto" panose="02000000000000000000" pitchFamily="2" charset="0"/>
+                <a:hlinkClick r:id="rId2" tooltip="DOI URL"/>
+              </a:rPr>
+              <a:t>https://doi.org/10.1021/acs.est.9b04522</a:t>
+            </a:r>
+            <a:endParaRPr lang="en-US" sz="1200" dirty="0"/>
           </a:p>
         </p:txBody>
       </p:sp>

</xml_diff>